<commit_message>
MARG poszter patch 2.0
</commit_message>
<xml_diff>
--- a/Doc/Prezik/Plakat/kutatási poszterek/MARG_kutaplakat.pptx
+++ b/Doc/Prezik/Plakat/kutatási poszterek/MARG_kutaplakat.pptx
@@ -2128,6 +2128,440 @@
       </p:grpSpPr>
       <p:sp>
         <p:nvSpPr>
+          <p:cNvPr id="34" name="Szövegdoboz 33">
+            <a:extLst>
+              <a:ext uri="{FF2B5EF4-FFF2-40B4-BE49-F238E27FC236}">
+                <a16:creationId xmlns:a16="http://schemas.microsoft.com/office/drawing/2014/main" id="{7C35704D-E227-4E5E-B6F8-29E1C0C74CC5}"/>
+              </a:ext>
+            </a:extLst>
+          </p:cNvPr>
+          <p:cNvSpPr txBox="1"/>
+          <p:nvPr/>
+        </p:nvSpPr>
+        <p:spPr>
+          <a:xfrm>
+            <a:off x="810408" y="22232406"/>
+            <a:ext cx="19800000" cy="2262950"/>
+          </a:xfrm>
+          <a:prstGeom prst="rect">
+            <a:avLst/>
+          </a:prstGeom>
+          <a:noFill/>
+          <a:ln>
+            <a:noFill/>
+          </a:ln>
+        </p:spPr>
+        <p:txBody>
+          <a:bodyPr wrap="square" rtlCol="0">
+            <a:noAutofit/>
+          </a:bodyPr>
+          <a:lstStyle/>
+          <a:p>
+            <a:r>
+              <a:rPr lang="hu-HU" sz="4000" b="1" dirty="0">
+                <a:solidFill>
+                  <a:srgbClr val="0062AF"/>
+                </a:solidFill>
+              </a:rPr>
+              <a:t>Konklúzió</a:t>
+            </a:r>
+          </a:p>
+          <a:p>
+            <a:pPr algn="just"/>
+            <a:r>
+              <a:rPr lang="hu-HU" sz="2400" dirty="0"/>
+              <a:t>Neurális hálózatok alkalmazásával megvalósítható szenzor fúzió ígéretes terület. Explicit modell definiálás nélkül az alkalmazás olyan jelenségekre is rátanulhat, amit nem feltétlen vennénk figyelembe egy modell megadása során. Betanulás után alacsony számítási igénye implementálhatóvá tesz kis fedélzeti számítási kapacitással rendelkező mobil robotokon a navigációs rendszer pontosításához. A valós mérési eredményeken való tanulásnak azonban meg van az hátránya, hogy a tanulás mindig az adott rendszer modelljére fog rátanulni. A specifikus tanulás az adatbázist különböző esetekkel bővítve mérsékelhető.  </a:t>
+            </a:r>
+            <a:endParaRPr lang="hu-HU" sz="2400" b="1" dirty="0"/>
+          </a:p>
+        </p:txBody>
+      </p:sp>
+      <p:sp>
+        <p:nvSpPr>
+          <p:cNvPr id="35" name="Szövegdoboz 34">
+            <a:extLst>
+              <a:ext uri="{FF2B5EF4-FFF2-40B4-BE49-F238E27FC236}">
+                <a16:creationId xmlns:a16="http://schemas.microsoft.com/office/drawing/2014/main" id="{3B79F03B-E2A3-44A9-B4F7-F6E548D555CB}"/>
+              </a:ext>
+            </a:extLst>
+          </p:cNvPr>
+          <p:cNvSpPr txBox="1"/>
+          <p:nvPr/>
+        </p:nvSpPr>
+        <p:spPr>
+          <a:xfrm>
+            <a:off x="810408" y="24469025"/>
+            <a:ext cx="19818595" cy="2923877"/>
+          </a:xfrm>
+          <a:prstGeom prst="rect">
+            <a:avLst/>
+          </a:prstGeom>
+          <a:noFill/>
+          <a:ln>
+            <a:noFill/>
+          </a:ln>
+        </p:spPr>
+        <p:txBody>
+          <a:bodyPr wrap="square" rtlCol="0">
+            <a:spAutoFit/>
+          </a:bodyPr>
+          <a:lstStyle/>
+          <a:p>
+            <a:r>
+              <a:rPr lang="hu-HU" sz="4000" b="1" dirty="0">
+                <a:solidFill>
+                  <a:srgbClr val="0062AF"/>
+                </a:solidFill>
+              </a:rPr>
+              <a:t>Hivatkozások</a:t>
+            </a:r>
+          </a:p>
+          <a:p>
+            <a:pPr algn="just" defTabSz="720000">
+              <a:buClr>
+                <a:schemeClr val="bg1"/>
+              </a:buClr>
+            </a:pPr>
+            <a:r>
+              <a:rPr lang="hu-HU" sz="2400" dirty="0"/>
+              <a:t>[1]	Nagy B., </a:t>
+            </a:r>
+            <a:r>
+              <a:rPr lang="hu-HU" sz="2400" dirty="0" err="1"/>
+              <a:t>Botzheim</a:t>
+            </a:r>
+            <a:r>
+              <a:rPr lang="hu-HU" sz="2400" dirty="0"/>
+              <a:t> J., Korondi P., </a:t>
+            </a:r>
+            <a:r>
+              <a:rPr lang="hu-HU" sz="2400" i="1" dirty="0"/>
+              <a:t>„</a:t>
+            </a:r>
+            <a:r>
+              <a:rPr lang="en-GB" sz="2400" i="1" dirty="0"/>
+              <a:t>Magnetic Angular Rate and Gravity Sensor Based Supervised Learning for Positioning Task</a:t>
+            </a:r>
+            <a:r>
+              <a:rPr lang="hu-HU" sz="2400" i="1" dirty="0"/>
+              <a:t>”, </a:t>
+            </a:r>
+            <a:r>
+              <a:rPr lang="en-GB" sz="2400" dirty="0"/>
+              <a:t>MDPI Sensors 19(24), 5364, </a:t>
+            </a:r>
+            <a:r>
+              <a:rPr lang="hu-HU" sz="2400" dirty="0"/>
+              <a:t>	</a:t>
+            </a:r>
+            <a:r>
+              <a:rPr lang="en-GB" sz="2400" dirty="0"/>
+              <a:t>IF.: 3.031</a:t>
+            </a:r>
+            <a:r>
+              <a:rPr lang="hu-HU" sz="2400" dirty="0"/>
+              <a:t> </a:t>
+            </a:r>
+            <a:r>
+              <a:rPr lang="en-GB" sz="2400" dirty="0"/>
+              <a:t>(2018)</a:t>
+            </a:r>
+            <a:r>
+              <a:rPr lang="hu-HU" sz="2400" i="1" dirty="0"/>
+              <a:t>  </a:t>
+            </a:r>
+          </a:p>
+          <a:p>
+            <a:pPr algn="just" defTabSz="720000">
+              <a:buClr>
+                <a:schemeClr val="bg1"/>
+              </a:buClr>
+            </a:pPr>
+            <a:r>
+              <a:rPr lang="hu-HU" sz="2400" dirty="0"/>
+              <a:t>[2]	 S.O.H. </a:t>
+            </a:r>
+            <a:r>
+              <a:rPr lang="hu-HU" sz="2400" dirty="0" err="1"/>
+              <a:t>Madgwick</a:t>
+            </a:r>
+            <a:r>
+              <a:rPr lang="hu-HU" sz="2400" dirty="0"/>
+              <a:t>, A.J.L. Harrison, R. </a:t>
+            </a:r>
+            <a:r>
+              <a:rPr lang="hu-HU" sz="2400" dirty="0" err="1"/>
+              <a:t>Vaidyanathan</a:t>
+            </a:r>
+            <a:r>
+              <a:rPr lang="hu-HU" sz="2400" dirty="0"/>
+              <a:t>, „</a:t>
+            </a:r>
+            <a:r>
+              <a:rPr lang="hu-HU" sz="2400" i="1" dirty="0" err="1"/>
+              <a:t>Estimation</a:t>
+            </a:r>
+            <a:r>
+              <a:rPr lang="hu-HU" sz="2400" i="1" dirty="0"/>
+              <a:t> of IMU and MARG </a:t>
+            </a:r>
+            <a:r>
+              <a:rPr lang="hu-HU" sz="2400" i="1" dirty="0" err="1"/>
+              <a:t>orientation</a:t>
+            </a:r>
+            <a:r>
+              <a:rPr lang="hu-HU" sz="2400" i="1" dirty="0"/>
+              <a:t> </a:t>
+            </a:r>
+            <a:r>
+              <a:rPr lang="hu-HU" sz="2400" i="1" dirty="0" err="1"/>
+              <a:t>using</a:t>
+            </a:r>
+            <a:r>
+              <a:rPr lang="hu-HU" sz="2400" i="1" dirty="0"/>
+              <a:t> a </a:t>
+            </a:r>
+            <a:r>
+              <a:rPr lang="hu-HU" sz="2400" i="1" dirty="0" err="1"/>
+              <a:t>gradient</a:t>
+            </a:r>
+            <a:r>
+              <a:rPr lang="hu-HU" sz="2400" i="1" dirty="0"/>
+              <a:t> </a:t>
+            </a:r>
+            <a:r>
+              <a:rPr lang="hu-HU" sz="2400" i="1" dirty="0" err="1"/>
+              <a:t>descent</a:t>
+            </a:r>
+            <a:r>
+              <a:rPr lang="hu-HU" sz="2400" i="1" dirty="0"/>
+              <a:t> </a:t>
+            </a:r>
+            <a:r>
+              <a:rPr lang="hu-HU" sz="2400" i="1" dirty="0" err="1"/>
+              <a:t>algorithm</a:t>
+            </a:r>
+            <a:r>
+              <a:rPr lang="hu-HU" sz="2400" i="1" dirty="0"/>
+              <a:t>”,</a:t>
+            </a:r>
+            <a:r>
+              <a:rPr lang="hu-HU" sz="2400" dirty="0"/>
+              <a:t> In </a:t>
+            </a:r>
+            <a:r>
+              <a:rPr lang="hu-HU" sz="2400" dirty="0" err="1"/>
+              <a:t>Proceedings</a:t>
+            </a:r>
+            <a:r>
+              <a:rPr lang="hu-HU" sz="2400" dirty="0"/>
+              <a:t> of 	</a:t>
+            </a:r>
+            <a:r>
+              <a:rPr lang="hu-HU" sz="2400" dirty="0" err="1"/>
+              <a:t>the</a:t>
+            </a:r>
+            <a:r>
+              <a:rPr lang="hu-HU" sz="2400" dirty="0"/>
+              <a:t> 2011 IEEE International </a:t>
+            </a:r>
+            <a:r>
+              <a:rPr lang="hu-HU" sz="2400" dirty="0" err="1"/>
+              <a:t>Conference</a:t>
+            </a:r>
+            <a:r>
+              <a:rPr lang="hu-HU" sz="2400" dirty="0"/>
+              <a:t> </a:t>
+            </a:r>
+            <a:r>
+              <a:rPr lang="hu-HU" sz="2400" dirty="0" err="1"/>
+              <a:t>on</a:t>
+            </a:r>
+            <a:r>
+              <a:rPr lang="hu-HU" sz="2400" dirty="0"/>
+              <a:t> </a:t>
+            </a:r>
+            <a:r>
+              <a:rPr lang="hu-HU" sz="2400" dirty="0" err="1"/>
+              <a:t>Rehabilitation</a:t>
+            </a:r>
+            <a:r>
+              <a:rPr lang="hu-HU" sz="2400" dirty="0"/>
+              <a:t> </a:t>
+            </a:r>
+            <a:r>
+              <a:rPr lang="hu-HU" sz="2400" dirty="0" err="1"/>
+              <a:t>Robotics</a:t>
+            </a:r>
+            <a:r>
+              <a:rPr lang="hu-HU" sz="2400" dirty="0"/>
+              <a:t>, </a:t>
+            </a:r>
+            <a:r>
+              <a:rPr lang="hu-HU" sz="2400" dirty="0" err="1"/>
+              <a:t>Zurich</a:t>
+            </a:r>
+            <a:r>
+              <a:rPr lang="hu-HU" sz="2400" dirty="0"/>
+              <a:t>, </a:t>
+            </a:r>
+            <a:r>
+              <a:rPr lang="hu-HU" sz="2400" dirty="0" err="1"/>
+              <a:t>Switzerland</a:t>
+            </a:r>
+            <a:r>
+              <a:rPr lang="hu-HU" sz="2400" dirty="0"/>
+              <a:t>, 29 </a:t>
+            </a:r>
+            <a:r>
+              <a:rPr lang="hu-HU" sz="2400" dirty="0" err="1"/>
+              <a:t>June</a:t>
+            </a:r>
+            <a:r>
+              <a:rPr lang="hu-HU" sz="2400" dirty="0"/>
+              <a:t>–1 </a:t>
+            </a:r>
+            <a:r>
+              <a:rPr lang="hu-HU" sz="2400" dirty="0" err="1"/>
+              <a:t>July</a:t>
+            </a:r>
+            <a:r>
+              <a:rPr lang="hu-HU" sz="2400" dirty="0"/>
+              <a:t> 2011. </a:t>
+            </a:r>
+          </a:p>
+          <a:p>
+            <a:pPr algn="just" defTabSz="720000">
+              <a:buClr>
+                <a:schemeClr val="bg1"/>
+              </a:buClr>
+            </a:pPr>
+            <a:r>
+              <a:rPr lang="hu-HU" sz="2400" dirty="0"/>
+              <a:t>[3]	M.R. Alfonso, A. </a:t>
+            </a:r>
+            <a:r>
+              <a:rPr lang="hu-HU" sz="2400" dirty="0" err="1"/>
+              <a:t>Frizera</a:t>
+            </a:r>
+            <a:r>
+              <a:rPr lang="hu-HU" sz="2400" dirty="0"/>
+              <a:t>, K.F. </a:t>
+            </a:r>
+            <a:r>
+              <a:rPr lang="hu-HU" sz="2400" dirty="0" err="1"/>
+              <a:t>Coco</a:t>
+            </a:r>
+            <a:r>
+              <a:rPr lang="hu-HU" sz="2400" dirty="0"/>
+              <a:t>, „</a:t>
+            </a:r>
+            <a:r>
+              <a:rPr lang="hu-HU" sz="2400" i="1" dirty="0" err="1"/>
+              <a:t>Magnetic</a:t>
+            </a:r>
+            <a:r>
+              <a:rPr lang="hu-HU" sz="2400" i="1" dirty="0"/>
+              <a:t>, </a:t>
+            </a:r>
+            <a:r>
+              <a:rPr lang="hu-HU" sz="2400" i="1" dirty="0" err="1"/>
+              <a:t>Angular</a:t>
+            </a:r>
+            <a:r>
+              <a:rPr lang="hu-HU" sz="2400" i="1" dirty="0"/>
+              <a:t> </a:t>
+            </a:r>
+            <a:r>
+              <a:rPr lang="hu-HU" sz="2400" i="1" dirty="0" err="1"/>
+              <a:t>Rate</a:t>
+            </a:r>
+            <a:r>
+              <a:rPr lang="hu-HU" sz="2400" i="1" dirty="0"/>
+              <a:t> and </a:t>
+            </a:r>
+            <a:r>
+              <a:rPr lang="hu-HU" sz="2400" i="1" dirty="0" err="1"/>
+              <a:t>Gravity</a:t>
+            </a:r>
+            <a:r>
+              <a:rPr lang="hu-HU" sz="2400" i="1" dirty="0"/>
+              <a:t> </a:t>
+            </a:r>
+            <a:r>
+              <a:rPr lang="hu-HU" sz="2400" i="1" dirty="0" err="1"/>
+              <a:t>Sensor</a:t>
+            </a:r>
+            <a:r>
+              <a:rPr lang="hu-HU" sz="2400" i="1" dirty="0"/>
+              <a:t> System </a:t>
+            </a:r>
+            <a:r>
+              <a:rPr lang="hu-HU" sz="2400" i="1" dirty="0" err="1"/>
+              <a:t>Fusion</a:t>
+            </a:r>
+            <a:r>
+              <a:rPr lang="hu-HU" sz="2400" i="1" dirty="0"/>
+              <a:t> </a:t>
+            </a:r>
+            <a:r>
+              <a:rPr lang="hu-HU" sz="2400" i="1" dirty="0" err="1"/>
+              <a:t>for</a:t>
+            </a:r>
+            <a:r>
+              <a:rPr lang="hu-HU" sz="2400" i="1" dirty="0"/>
+              <a:t> </a:t>
+            </a:r>
+            <a:r>
+              <a:rPr lang="hu-HU" sz="2400" i="1" dirty="0" err="1"/>
+              <a:t>Orientation</a:t>
+            </a:r>
+            <a:r>
+              <a:rPr lang="hu-HU" sz="2400" i="1" dirty="0"/>
+              <a:t> </a:t>
+            </a:r>
+            <a:r>
+              <a:rPr lang="hu-HU" sz="2400" i="1" dirty="0" err="1"/>
+              <a:t>Estimation</a:t>
+            </a:r>
+            <a:r>
+              <a:rPr lang="hu-HU" sz="2400" i="1" dirty="0"/>
+              <a:t>”,</a:t>
+            </a:r>
+            <a:r>
+              <a:rPr lang="hu-HU" sz="2400" dirty="0"/>
+              <a:t> In </a:t>
+            </a:r>
+            <a:r>
+              <a:rPr lang="hu-HU" sz="2400" dirty="0" err="1"/>
+              <a:t>Studies</a:t>
+            </a:r>
+            <a:r>
+              <a:rPr lang="hu-HU" sz="2400" dirty="0"/>
+              <a:t> in Health 	</a:t>
+            </a:r>
+            <a:r>
+              <a:rPr lang="hu-HU" sz="2400" dirty="0" err="1"/>
+              <a:t>Technology</a:t>
+            </a:r>
+            <a:r>
+              <a:rPr lang="hu-HU" sz="2400" dirty="0"/>
+              <a:t> and </a:t>
+            </a:r>
+            <a:r>
+              <a:rPr lang="hu-HU" sz="2400" dirty="0" err="1"/>
+              <a:t>Informatics</a:t>
+            </a:r>
+            <a:r>
+              <a:rPr lang="hu-HU" sz="2400" dirty="0"/>
+              <a:t>, 2015; pp. 261–266.</a:t>
+            </a:r>
+            <a:endParaRPr lang="hu-HU" sz="2400" b="1" dirty="0"/>
+          </a:p>
+        </p:txBody>
+      </p:sp>
+      <p:sp>
+        <p:nvSpPr>
           <p:cNvPr id="6" name="Title Placeholder 1">
             <a:extLst>
               <a:ext uri="{FF2B5EF4-FFF2-40B4-BE49-F238E27FC236}">
@@ -2546,7 +2980,7 @@
             <a:pPr algn="just"/>
             <a:r>
               <a:rPr lang="hu-HU" sz="2400" dirty="0"/>
-              <a:t>Az orientáció és pozíció becslés fontos eleme az autonóm robotok navigációs rendszerének. A navigáció megbízható megoldást követel, melynek alkalmazhatónak kell lennie limitált fedélzeti számítási kapacitással rendelkező robotokon is. A rendszer megbízhatóságának növelése érdekében a külső szenzorokkal ellentétben előnyt élveznek a robot fedélzeti szenzorjai. A külső szenzorokkal a robot elveszítheti a kapcsolatot, mely a navigációs rendszer részleges vagy teljes megbénulásához vezethet. Egy teljesen autonóm robotnak képesnek kell lennie külső szenzoros segítség nélkül működni.  </a:t>
+              <a:t>Az orientáció és pozíció becslés fontos eleme az autonóm robotok navigációs rendszerének mely problémakörrel számos kutatás foglalkozik [2][3]. A navigáció megbízható megoldást követel, melynek alkalmazhatónak kell lennie limitált fedélzeti számítási kapacitással rendelkező robotokon is. A rendszer megbízhatóságának növelése érdekében a külső szenzorokkal ellentétben előnyt élveznek a robot fedélzeti szenzorjai. A külső szenzorokkal a robot elveszítheti a kapcsolatot, mely a navigációs rendszer részleges vagy teljes megbénulásához vezethet. Egy teljesen autonóm robotnak képesnek kell lennie külső szenzoros segítség nélkül működni.  </a:t>
             </a:r>
             <a:endParaRPr lang="hu-HU" dirty="0"/>
           </a:p>
@@ -2566,8 +3000,8 @@
         </p:nvSpPr>
         <p:spPr>
           <a:xfrm>
-            <a:off x="10833129" y="7623209"/>
-            <a:ext cx="9742648" cy="3997291"/>
+            <a:off x="10701110" y="12076767"/>
+            <a:ext cx="9742648" cy="1905566"/>
           </a:xfrm>
           <a:prstGeom prst="rect">
             <a:avLst/>
@@ -2607,13 +3041,6 @@
               <a:t>Periodikus mozgás során a szenzor egy 30 mm hosszú ingára volt felszerelve. 6324 mérési ponton tanulva a neurális háló a becslés során átlagosan 4 mm hibát vétett. </a:t>
             </a:r>
           </a:p>
-          <a:p>
-            <a:pPr algn="just"/>
-            <a:r>
-              <a:rPr lang="hu-HU" sz="2400" dirty="0"/>
-              <a:t>A transzlációs mozgás során a tanuláshoz a neurális háló 39925 adatpontot használt. A tanulási fázis 1500 másodpercig tartott melynek eredményekén egy 1624 mm tartományú mozgás során a becslést követően 41 mm átlagos hibát becsült. A hibaszámítás mindkét esetben MSE módszeren alapult. A mozgástartományokat figyelembe véve 2-7 %-os abszolút relatív hibát állapíthatunk meg.     </a:t>
-            </a:r>
-          </a:p>
         </p:txBody>
       </p:sp>
       <p:sp>
@@ -2630,8 +3057,8 @@
         </p:nvSpPr>
         <p:spPr>
           <a:xfrm>
-            <a:off x="681045" y="11620500"/>
-            <a:ext cx="9710738" cy="3869606"/>
+            <a:off x="668408" y="11693977"/>
+            <a:ext cx="9710738" cy="2183072"/>
           </a:xfrm>
           <a:prstGeom prst="rect">
             <a:avLst/>
@@ -2688,15 +3115,11 @@
           </a:p>
           <a:p>
             <a:pPr algn="just"/>
-            <a:r>
-              <a:rPr lang="hu-HU" sz="2400" b="0" dirty="0">
-                <a:solidFill>
-                  <a:schemeClr val="tx1"/>
-                </a:solidFill>
-              </a:rPr>
-              <a:t>A valós mérések során a referencia jelnek egy 18 kamerából álló Motion Capture  rendszer pozíció adatait használtuk. A mérési elrendezés koncepcióját az 1. kép mutatja. A mérések során a MARG szenzort először periodikus inga mozgás során vizsgáltuk majd nem-periodikus transzlációs mozgás során.  </a:t>
-            </a:r>
-            <a:endParaRPr lang="hu-HU" dirty="0"/>
+            <a:endParaRPr lang="hu-HU" sz="2400" b="0" dirty="0">
+              <a:solidFill>
+                <a:schemeClr val="tx1"/>
+              </a:solidFill>
+            </a:endParaRPr>
           </a:p>
         </p:txBody>
       </p:sp>
@@ -2716,7 +3139,7 @@
         </p:nvCxnSpPr>
         <p:spPr>
           <a:xfrm>
-            <a:off x="791813" y="22346345"/>
+            <a:off x="791813" y="22230233"/>
             <a:ext cx="19800000" cy="0"/>
           </a:xfrm>
           <a:prstGeom prst="line">
@@ -2759,7 +3182,7 @@
         </p:nvCxnSpPr>
         <p:spPr>
           <a:xfrm>
-            <a:off x="791813" y="24628928"/>
+            <a:off x="791813" y="24483788"/>
             <a:ext cx="19800000" cy="0"/>
           </a:xfrm>
           <a:prstGeom prst="line">
@@ -2786,491 +3209,6 @@
           </a:fontRef>
         </p:style>
       </p:cxnSp>
-      <p:sp>
-        <p:nvSpPr>
-          <p:cNvPr id="34" name="Szövegdoboz 33">
-            <a:extLst>
-              <a:ext uri="{FF2B5EF4-FFF2-40B4-BE49-F238E27FC236}">
-                <a16:creationId xmlns:a16="http://schemas.microsoft.com/office/drawing/2014/main" id="{7C35704D-E227-4E5E-B6F8-29E1C0C74CC5}"/>
-              </a:ext>
-            </a:extLst>
-          </p:cNvPr>
-          <p:cNvSpPr txBox="1"/>
-          <p:nvPr/>
-        </p:nvSpPr>
-        <p:spPr>
-          <a:xfrm>
-            <a:off x="810408" y="22363032"/>
-            <a:ext cx="19800000" cy="2262950"/>
-          </a:xfrm>
-          <a:prstGeom prst="rect">
-            <a:avLst/>
-          </a:prstGeom>
-          <a:noFill/>
-          <a:ln>
-            <a:noFill/>
-          </a:ln>
-        </p:spPr>
-        <p:txBody>
-          <a:bodyPr wrap="square" rtlCol="0">
-            <a:noAutofit/>
-          </a:bodyPr>
-          <a:lstStyle/>
-          <a:p>
-            <a:r>
-              <a:rPr lang="hu-HU" sz="4000" b="1" dirty="0">
-                <a:solidFill>
-                  <a:srgbClr val="0062AF"/>
-                </a:solidFill>
-              </a:rPr>
-              <a:t>Konklúzió</a:t>
-            </a:r>
-          </a:p>
-          <a:p>
-            <a:pPr algn="just"/>
-            <a:r>
-              <a:rPr lang="hu-HU" sz="2400" dirty="0"/>
-              <a:t>Neurális hálózatok alkalmazásával megvalósítható szenzor fúzió ígéretes terület. Explicit modell definiálás nélkül az alkalmazás olyan jelenségekre is rátanulhat, amit nem feltétlen vennénk figyelembe egy modell megadása során. Betanulás után alacsony számítási igénye implementálhatóvá tesz kis fedélzeti számítási kapacitással rendelkező mobil robotokon a navigációs rendszer pontosításához. A valós mérési eredményeken való tanulásnak azonban meg van az hátránya, hogy a tanulás mindig az adott rendszer modelljére fog rátanulni. A specifikus tanulás az adatbázist különböző esetekkel bővítve mérsékelhető.  </a:t>
-            </a:r>
-            <a:endParaRPr lang="hu-HU" sz="2400" b="1" dirty="0"/>
-          </a:p>
-        </p:txBody>
-      </p:sp>
-      <p:sp>
-        <p:nvSpPr>
-          <p:cNvPr id="35" name="Szövegdoboz 34">
-            <a:extLst>
-              <a:ext uri="{FF2B5EF4-FFF2-40B4-BE49-F238E27FC236}">
-                <a16:creationId xmlns:a16="http://schemas.microsoft.com/office/drawing/2014/main" id="{3B79F03B-E2A3-44A9-B4F7-F6E548D555CB}"/>
-              </a:ext>
-            </a:extLst>
-          </p:cNvPr>
-          <p:cNvSpPr txBox="1"/>
-          <p:nvPr/>
-        </p:nvSpPr>
-        <p:spPr>
-          <a:xfrm>
-            <a:off x="791813" y="24631875"/>
-            <a:ext cx="19818595" cy="2554545"/>
-          </a:xfrm>
-          <a:prstGeom prst="rect">
-            <a:avLst/>
-          </a:prstGeom>
-          <a:noFill/>
-          <a:ln>
-            <a:noFill/>
-          </a:ln>
-        </p:spPr>
-        <p:txBody>
-          <a:bodyPr wrap="square" rtlCol="0">
-            <a:spAutoFit/>
-          </a:bodyPr>
-          <a:lstStyle/>
-          <a:p>
-            <a:r>
-              <a:rPr lang="hu-HU" sz="4000" b="1" dirty="0">
-                <a:solidFill>
-                  <a:srgbClr val="0062AF"/>
-                </a:solidFill>
-              </a:rPr>
-              <a:t>Hivatkozások</a:t>
-            </a:r>
-          </a:p>
-          <a:p>
-            <a:pPr algn="just" defTabSz="720000">
-              <a:buClr>
-                <a:schemeClr val="bg1"/>
-              </a:buClr>
-            </a:pPr>
-            <a:r>
-              <a:rPr lang="hu-HU" sz="2400" dirty="0"/>
-              <a:t>[1]	Nagy B., </a:t>
-            </a:r>
-            <a:r>
-              <a:rPr lang="hu-HU" sz="2400" dirty="0" err="1"/>
-              <a:t>Botzheim</a:t>
-            </a:r>
-            <a:r>
-              <a:rPr lang="hu-HU" sz="2400" dirty="0"/>
-              <a:t> J., Korondi P., </a:t>
-            </a:r>
-            <a:r>
-              <a:rPr lang="hu-HU" sz="2400" i="1" dirty="0"/>
-              <a:t>„</a:t>
-            </a:r>
-            <a:r>
-              <a:rPr lang="en-GB" sz="2400" i="1" dirty="0"/>
-              <a:t>Magnetic Angular Rate and Gravity Sensor Based Supervised Learning for Positioning Task</a:t>
-            </a:r>
-            <a:r>
-              <a:rPr lang="hu-HU" sz="2400" i="1" dirty="0"/>
-              <a:t>”, </a:t>
-            </a:r>
-            <a:r>
-              <a:rPr lang="en-GB" sz="2400" dirty="0"/>
-              <a:t>MDPI Sensors 19(24), 5364, </a:t>
-            </a:r>
-            <a:r>
-              <a:rPr lang="hu-HU" sz="2400" dirty="0"/>
-              <a:t>	</a:t>
-            </a:r>
-            <a:r>
-              <a:rPr lang="en-GB" sz="2400" dirty="0"/>
-              <a:t>IF.: 3.031</a:t>
-            </a:r>
-            <a:r>
-              <a:rPr lang="hu-HU" sz="2400" dirty="0"/>
-              <a:t> </a:t>
-            </a:r>
-            <a:r>
-              <a:rPr lang="en-GB" sz="2400" dirty="0"/>
-              <a:t>(2018)</a:t>
-            </a:r>
-            <a:r>
-              <a:rPr lang="hu-HU" sz="2400" i="1" dirty="0"/>
-              <a:t>  </a:t>
-            </a:r>
-          </a:p>
-          <a:p>
-            <a:pPr algn="just" defTabSz="720000">
-              <a:buClr>
-                <a:schemeClr val="bg1"/>
-              </a:buClr>
-            </a:pPr>
-            <a:r>
-              <a:rPr lang="hu-HU" sz="2400" dirty="0"/>
-              <a:t>[2]	</a:t>
-            </a:r>
-            <a:r>
-              <a:rPr lang="hu-HU" sz="2400" dirty="0" err="1"/>
-              <a:t>Ut</a:t>
-            </a:r>
-            <a:r>
-              <a:rPr lang="hu-HU" sz="2400" dirty="0"/>
-              <a:t> </a:t>
-            </a:r>
-            <a:r>
-              <a:rPr lang="hu-HU" sz="2400" dirty="0" err="1"/>
-              <a:t>enim</a:t>
-            </a:r>
-            <a:r>
-              <a:rPr lang="hu-HU" sz="2400" dirty="0"/>
-              <a:t> ad minim </a:t>
-            </a:r>
-            <a:r>
-              <a:rPr lang="hu-HU" sz="2400" dirty="0" err="1"/>
-              <a:t>veniam</a:t>
-            </a:r>
-            <a:r>
-              <a:rPr lang="hu-HU" sz="2400" dirty="0"/>
-              <a:t>, </a:t>
-            </a:r>
-            <a:r>
-              <a:rPr lang="hu-HU" sz="2400" dirty="0" err="1"/>
-              <a:t>quis</a:t>
-            </a:r>
-            <a:r>
-              <a:rPr lang="hu-HU" sz="2400" dirty="0"/>
-              <a:t> </a:t>
-            </a:r>
-            <a:r>
-              <a:rPr lang="hu-HU" sz="2400" dirty="0" err="1"/>
-              <a:t>nostrud</a:t>
-            </a:r>
-            <a:r>
-              <a:rPr lang="hu-HU" sz="2400" dirty="0"/>
-              <a:t> </a:t>
-            </a:r>
-            <a:r>
-              <a:rPr lang="hu-HU" sz="2400" dirty="0" err="1"/>
-              <a:t>exercitation</a:t>
-            </a:r>
-            <a:r>
-              <a:rPr lang="hu-HU" sz="2400" dirty="0"/>
-              <a:t> </a:t>
-            </a:r>
-            <a:r>
-              <a:rPr lang="hu-HU" sz="2400" dirty="0" err="1"/>
-              <a:t>ullamco</a:t>
-            </a:r>
-            <a:r>
-              <a:rPr lang="hu-HU" sz="2400" dirty="0"/>
-              <a:t> </a:t>
-            </a:r>
-            <a:r>
-              <a:rPr lang="hu-HU" sz="2400" dirty="0" err="1"/>
-              <a:t>laboris</a:t>
-            </a:r>
-            <a:r>
-              <a:rPr lang="hu-HU" sz="2400" dirty="0"/>
-              <a:t> </a:t>
-            </a:r>
-            <a:r>
-              <a:rPr lang="hu-HU" sz="2400" dirty="0" err="1"/>
-              <a:t>nisi</a:t>
-            </a:r>
-            <a:r>
-              <a:rPr lang="hu-HU" sz="2400" dirty="0"/>
-              <a:t> </a:t>
-            </a:r>
-            <a:r>
-              <a:rPr lang="hu-HU" sz="2400" dirty="0" err="1"/>
-              <a:t>ut</a:t>
-            </a:r>
-            <a:r>
-              <a:rPr lang="hu-HU" sz="2400" dirty="0"/>
-              <a:t> </a:t>
-            </a:r>
-            <a:r>
-              <a:rPr lang="hu-HU" sz="2400" dirty="0" err="1"/>
-              <a:t>aliquip</a:t>
-            </a:r>
-            <a:r>
-              <a:rPr lang="hu-HU" sz="2400" dirty="0"/>
-              <a:t> ex </a:t>
-            </a:r>
-            <a:r>
-              <a:rPr lang="hu-HU" sz="2400" dirty="0" err="1"/>
-              <a:t>ea</a:t>
-            </a:r>
-            <a:r>
-              <a:rPr lang="hu-HU" sz="2400" dirty="0"/>
-              <a:t> </a:t>
-            </a:r>
-            <a:r>
-              <a:rPr lang="hu-HU" sz="2400" dirty="0" err="1"/>
-              <a:t>commodo</a:t>
-            </a:r>
-            <a:r>
-              <a:rPr lang="hu-HU" sz="2400" dirty="0"/>
-              <a:t> </a:t>
-            </a:r>
-            <a:r>
-              <a:rPr lang="hu-HU" sz="2400" dirty="0" err="1"/>
-              <a:t>consequat</a:t>
-            </a:r>
-            <a:r>
-              <a:rPr lang="hu-HU" sz="2400" dirty="0"/>
-              <a:t>.</a:t>
-            </a:r>
-          </a:p>
-          <a:p>
-            <a:pPr algn="just" defTabSz="720000">
-              <a:buClr>
-                <a:schemeClr val="bg1"/>
-              </a:buClr>
-            </a:pPr>
-            <a:r>
-              <a:rPr lang="hu-HU" sz="2400" dirty="0"/>
-              <a:t>[3]	</a:t>
-            </a:r>
-            <a:r>
-              <a:rPr lang="hu-HU" sz="2400" dirty="0" err="1"/>
-              <a:t>Duis</a:t>
-            </a:r>
-            <a:r>
-              <a:rPr lang="hu-HU" sz="2400" dirty="0"/>
-              <a:t> </a:t>
-            </a:r>
-            <a:r>
-              <a:rPr lang="hu-HU" sz="2400" dirty="0" err="1"/>
-              <a:t>aute</a:t>
-            </a:r>
-            <a:r>
-              <a:rPr lang="hu-HU" sz="2400" dirty="0"/>
-              <a:t> </a:t>
-            </a:r>
-            <a:r>
-              <a:rPr lang="hu-HU" sz="2400" dirty="0" err="1"/>
-              <a:t>irure</a:t>
-            </a:r>
-            <a:r>
-              <a:rPr lang="hu-HU" sz="2400" dirty="0"/>
-              <a:t> </a:t>
-            </a:r>
-            <a:r>
-              <a:rPr lang="hu-HU" sz="2400" dirty="0" err="1"/>
-              <a:t>dolor</a:t>
-            </a:r>
-            <a:r>
-              <a:rPr lang="hu-HU" sz="2400" dirty="0"/>
-              <a:t> in </a:t>
-            </a:r>
-            <a:r>
-              <a:rPr lang="hu-HU" sz="2400" dirty="0" err="1"/>
-              <a:t>reprehenderit</a:t>
-            </a:r>
-            <a:r>
-              <a:rPr lang="hu-HU" sz="2400" dirty="0"/>
-              <a:t> in </a:t>
-            </a:r>
-            <a:r>
-              <a:rPr lang="hu-HU" sz="2400" dirty="0" err="1"/>
-              <a:t>voluptate</a:t>
-            </a:r>
-            <a:r>
-              <a:rPr lang="hu-HU" sz="2400" dirty="0"/>
-              <a:t> </a:t>
-            </a:r>
-            <a:r>
-              <a:rPr lang="hu-HU" sz="2400" dirty="0" err="1"/>
-              <a:t>velit</a:t>
-            </a:r>
-            <a:r>
-              <a:rPr lang="hu-HU" sz="2400" dirty="0"/>
-              <a:t> esse </a:t>
-            </a:r>
-            <a:r>
-              <a:rPr lang="hu-HU" sz="2400" dirty="0" err="1"/>
-              <a:t>cillum</a:t>
-            </a:r>
-            <a:r>
-              <a:rPr lang="hu-HU" sz="2400" dirty="0"/>
-              <a:t> </a:t>
-            </a:r>
-            <a:r>
-              <a:rPr lang="hu-HU" sz="2400" dirty="0" err="1"/>
-              <a:t>dolore</a:t>
-            </a:r>
-            <a:r>
-              <a:rPr lang="hu-HU" sz="2400" dirty="0"/>
-              <a:t> </a:t>
-            </a:r>
-            <a:r>
-              <a:rPr lang="hu-HU" sz="2400" dirty="0" err="1"/>
-              <a:t>eu</a:t>
-            </a:r>
-            <a:r>
-              <a:rPr lang="hu-HU" sz="2400" dirty="0"/>
-              <a:t> </a:t>
-            </a:r>
-            <a:r>
-              <a:rPr lang="hu-HU" sz="2400" dirty="0" err="1"/>
-              <a:t>fugiat</a:t>
-            </a:r>
-            <a:r>
-              <a:rPr lang="hu-HU" sz="2400" dirty="0"/>
-              <a:t> nulla </a:t>
-            </a:r>
-            <a:r>
-              <a:rPr lang="hu-HU" sz="2400" dirty="0" err="1"/>
-              <a:t>pariatur</a:t>
-            </a:r>
-            <a:r>
-              <a:rPr lang="hu-HU" sz="2400" dirty="0"/>
-              <a:t>.</a:t>
-            </a:r>
-          </a:p>
-          <a:p>
-            <a:pPr algn="just" defTabSz="720000">
-              <a:buClr>
-                <a:schemeClr val="bg1"/>
-              </a:buClr>
-            </a:pPr>
-            <a:r>
-              <a:rPr lang="hu-HU" sz="2400" dirty="0"/>
-              <a:t>[4]	</a:t>
-            </a:r>
-            <a:r>
-              <a:rPr lang="hu-HU" sz="2400" dirty="0" err="1"/>
-              <a:t>Excepteur</a:t>
-            </a:r>
-            <a:r>
-              <a:rPr lang="hu-HU" sz="2400" dirty="0"/>
-              <a:t> sint </a:t>
-            </a:r>
-            <a:r>
-              <a:rPr lang="hu-HU" sz="2400" dirty="0" err="1"/>
-              <a:t>occaecat</a:t>
-            </a:r>
-            <a:r>
-              <a:rPr lang="hu-HU" sz="2400" dirty="0"/>
-              <a:t> </a:t>
-            </a:r>
-            <a:r>
-              <a:rPr lang="hu-HU" sz="2400" dirty="0" err="1"/>
-              <a:t>cupidatat</a:t>
-            </a:r>
-            <a:r>
-              <a:rPr lang="hu-HU" sz="2400" dirty="0"/>
-              <a:t> non </a:t>
-            </a:r>
-            <a:r>
-              <a:rPr lang="hu-HU" sz="2400" dirty="0" err="1"/>
-              <a:t>proident</a:t>
-            </a:r>
-            <a:r>
-              <a:rPr lang="hu-HU" sz="2400" dirty="0"/>
-              <a:t>, </a:t>
-            </a:r>
-            <a:r>
-              <a:rPr lang="hu-HU" sz="2400" dirty="0" err="1"/>
-              <a:t>sunt</a:t>
-            </a:r>
-            <a:r>
-              <a:rPr lang="hu-HU" sz="2400" dirty="0"/>
-              <a:t> in culpa </a:t>
-            </a:r>
-            <a:r>
-              <a:rPr lang="hu-HU" sz="2400" dirty="0" err="1"/>
-              <a:t>qui</a:t>
-            </a:r>
-            <a:r>
-              <a:rPr lang="hu-HU" sz="2400" dirty="0"/>
-              <a:t> </a:t>
-            </a:r>
-            <a:r>
-              <a:rPr lang="hu-HU" sz="2400" dirty="0" err="1"/>
-              <a:t>officia</a:t>
-            </a:r>
-            <a:r>
-              <a:rPr lang="hu-HU" sz="2400" dirty="0"/>
-              <a:t> </a:t>
-            </a:r>
-            <a:r>
-              <a:rPr lang="hu-HU" sz="2400" dirty="0" err="1"/>
-              <a:t>deserunt</a:t>
-            </a:r>
-            <a:r>
-              <a:rPr lang="hu-HU" sz="2400" dirty="0"/>
-              <a:t> </a:t>
-            </a:r>
-            <a:r>
-              <a:rPr lang="hu-HU" sz="2400" dirty="0" err="1"/>
-              <a:t>mollit</a:t>
-            </a:r>
-            <a:r>
-              <a:rPr lang="hu-HU" sz="2400" dirty="0"/>
-              <a:t> </a:t>
-            </a:r>
-            <a:r>
-              <a:rPr lang="hu-HU" sz="2400" dirty="0" err="1"/>
-              <a:t>anim</a:t>
-            </a:r>
-            <a:r>
-              <a:rPr lang="hu-HU" sz="2400" dirty="0"/>
-              <a:t> </a:t>
-            </a:r>
-            <a:r>
-              <a:rPr lang="hu-HU" sz="2400" dirty="0" err="1"/>
-              <a:t>id</a:t>
-            </a:r>
-            <a:r>
-              <a:rPr lang="hu-HU" sz="2400" dirty="0"/>
-              <a:t> est </a:t>
-            </a:r>
-            <a:r>
-              <a:rPr lang="hu-HU" sz="2400" dirty="0" err="1"/>
-              <a:t>laborum</a:t>
-            </a:r>
-            <a:r>
-              <a:rPr lang="hu-HU" sz="2400" dirty="0"/>
-              <a:t>.</a:t>
-            </a:r>
-            <a:endParaRPr lang="hu-HU" sz="2400" b="1" dirty="0"/>
-          </a:p>
-        </p:txBody>
-      </p:sp>
       <p:cxnSp>
         <p:nvCxnSpPr>
           <p:cNvPr id="38" name="Egyenes összekötő 37">
@@ -3328,7 +3266,7 @@
         </p:nvSpPr>
         <p:spPr>
           <a:xfrm>
-            <a:off x="5419163" y="21693329"/>
+            <a:off x="5254224" y="18388707"/>
             <a:ext cx="4074498" cy="400110"/>
           </a:xfrm>
           <a:prstGeom prst="rect">
@@ -3345,7 +3283,7 @@
             <a:pPr algn="ctr"/>
             <a:r>
               <a:rPr lang="hu-HU" sz="2000" dirty="0"/>
-              <a:t>1. kép. Mérési koncepció</a:t>
+              <a:t>1. ábra: Mérési koncepció</a:t>
             </a:r>
           </a:p>
         </p:txBody>
@@ -3378,8 +3316,8 @@
         </p:blipFill>
         <p:spPr>
           <a:xfrm>
-            <a:off x="12029453" y="15257219"/>
-            <a:ext cx="7414147" cy="6381491"/>
+            <a:off x="15642867" y="13803571"/>
+            <a:ext cx="4689087" cy="4035983"/>
           </a:xfrm>
           <a:prstGeom prst="rect">
             <a:avLst/>
@@ -3400,7 +3338,7 @@
         </p:nvSpPr>
         <p:spPr>
           <a:xfrm>
-            <a:off x="13407194" y="21693329"/>
+            <a:off x="15690151" y="17912307"/>
             <a:ext cx="4594517" cy="400110"/>
           </a:xfrm>
           <a:prstGeom prst="rect">
@@ -3417,7 +3355,7 @@
             <a:pPr algn="ctr"/>
             <a:r>
               <a:rPr lang="hu-HU" sz="2000" dirty="0"/>
-              <a:t>2. kép. Transzlációs mozgás és becslése</a:t>
+              <a:t>3. ábra: Transzlációs mozgás és becslése</a:t>
             </a:r>
           </a:p>
         </p:txBody>
@@ -3450,8 +3388,8 @@
         </p:blipFill>
         <p:spPr>
           <a:xfrm>
-            <a:off x="4267204" y="15706601"/>
-            <a:ext cx="6147158" cy="5812107"/>
+            <a:off x="4921936" y="13623853"/>
+            <a:ext cx="5033301" cy="4758961"/>
           </a:xfrm>
           <a:prstGeom prst="rect">
             <a:avLst/>
@@ -3472,8 +3410,8 @@
         </p:nvSpPr>
         <p:spPr>
           <a:xfrm>
-            <a:off x="703623" y="15490106"/>
-            <a:ext cx="4116027" cy="6603331"/>
+            <a:off x="703624" y="13773990"/>
+            <a:ext cx="3896348" cy="5210694"/>
           </a:xfrm>
           <a:prstGeom prst="rect">
             <a:avLst/>
@@ -3515,8 +3453,11 @@
                   <a:schemeClr val="tx1"/>
                 </a:solidFill>
               </a:rPr>
-              <a:t>Első</a:t>
-            </a:r>
+              <a:t>A valós mérések során a referencia jelnek egy 18 kamerából álló Motion Capture  rendszer pozíció adatait használtuk. A mérési elrendezés koncepcióját az 1. ábra mutatja. A mérések során a MARG szenzort először periodikus inga mozgás során vizsgáltuk majd nem-periodikus transzlációs mozgás során. A mérések során szinkronizáltan rögzítettük a MARG szenzor 9</a:t>
+            </a:r>
+          </a:p>
+          <a:p>
+            <a:pPr algn="just"/>
             <a:endParaRPr lang="hu-HU" dirty="0"/>
           </a:p>
         </p:txBody>
@@ -3535,8 +3476,8 @@
         </p:nvSpPr>
         <p:spPr>
           <a:xfrm>
-            <a:off x="10779916" y="11546385"/>
-            <a:ext cx="9922664" cy="4771353"/>
+            <a:off x="10706326" y="18250678"/>
+            <a:ext cx="9922664" cy="3831094"/>
           </a:xfrm>
           <a:prstGeom prst="rect">
             <a:avLst/>
@@ -3573,7 +3514,200 @@
             <a:pPr algn="just"/>
             <a:r>
               <a:rPr lang="hu-HU" sz="2400" dirty="0"/>
-              <a:t>A neurális hálózatok alkalmazásának köszönhetően az algoritmus szabadon kombinálhatta a különböző szenzor jeleket. A tesztek rávilágítottak a tanulás sajátosságaira. Az alkalmazás például megtanulta a mérési elrendezés sajátosságait, hibáit. A transzlációs mozgás során fellépő tapadási súrlódás a szenzor megindítását megelőzően a szenzor tartó megbillenését eredményezte. Ezt a jelenséget kihasználva az algoritmust megtanulta előre jósolni a tényleges mozgást. Ez figyelhető meg a 2. képen is, ahol a becsült (piros) jel változása megelőzi a tényleges referencia jel (zöld) változását.</a:t>
+              <a:t>A neurális hálózatok alkalmazásának köszönhetően az algoritmus szabadon kombinálhatta a különböző szenzor jeleket. A tesztek rávilágítottak a tanulás sajátosságaira. Az alkalmazás például megtanulta a mérési elrendezés sajátosságait, hibáit. A transzlációs mozgás során fellépő tapadási súrlódás a szenzor megindítását megelőzően a szenzor tartó megbillenését eredményezte. Ezt a jelenséget kihasználva az algoritmust megtanulta előre jósolni a tényleges mozgást. Ez figyelhető meg a 3. ábrán is, ahol a becsült (piros) jel változása megelőzi a tényleges referencia jel (zöld) változását.</a:t>
+            </a:r>
+            <a:endParaRPr lang="hu-HU" dirty="0"/>
+          </a:p>
+        </p:txBody>
+      </p:sp>
+      <p:sp>
+        <p:nvSpPr>
+          <p:cNvPr id="40" name="Szövegdoboz 39">
+            <a:extLst>
+              <a:ext uri="{FF2B5EF4-FFF2-40B4-BE49-F238E27FC236}">
+                <a16:creationId xmlns:a16="http://schemas.microsoft.com/office/drawing/2014/main" id="{64420621-556A-4BB7-A0C1-579CB7967BDA}"/>
+              </a:ext>
+            </a:extLst>
+          </p:cNvPr>
+          <p:cNvSpPr txBox="1"/>
+          <p:nvPr/>
+        </p:nvSpPr>
+        <p:spPr>
+          <a:xfrm>
+            <a:off x="10710407" y="13739520"/>
+            <a:ext cx="4447886" cy="4866498"/>
+          </a:xfrm>
+          <a:prstGeom prst="rect">
+            <a:avLst/>
+          </a:prstGeom>
+          <a:noFill/>
+          <a:scene3d>
+            <a:camera prst="orthographicFront"/>
+            <a:lightRig rig="threePt" dir="t"/>
+          </a:scene3d>
+          <a:sp3d prstMaterial="plastic">
+            <a:bevelT w="101600" h="101600"/>
+            <a:bevelB w="101600" h="101600"/>
+            <a:extrusionClr>
+              <a:schemeClr val="bg1"/>
+            </a:extrusionClr>
+          </a:sp3d>
+        </p:spPr>
+        <p:txBody>
+          <a:bodyPr wrap="square" rtlCol="0">
+            <a:noAutofit/>
+          </a:bodyPr>
+          <a:lstStyle/>
+          <a:p>
+            <a:pPr algn="just"/>
+            <a:r>
+              <a:rPr lang="hu-HU" sz="2400" dirty="0"/>
+              <a:t>A transzlációs mozgás során a tanuláshoz a neurális háló 39925 adatpontot használt. A tanulási fázis 1500 másodpercig tartott melynek eredményekén egy 1624 mm tartományú mozgás során a becslést követően 41 mm átlagos hibát becsült. A hibaszámítás mindkét esetben MSE módszeren alapult. A mozgástartományokat figyelembe véve 2-7 %-os abszolút relatív hibát állapíthatunk meg.     </a:t>
+            </a:r>
+          </a:p>
+        </p:txBody>
+      </p:sp>
+      <p:pic>
+        <p:nvPicPr>
+          <p:cNvPr id="22" name="Kép 21" descr="A képen rajz látható&#10;&#10;Automatikusan generált leírás">
+            <a:extLst>
+              <a:ext uri="{FF2B5EF4-FFF2-40B4-BE49-F238E27FC236}">
+                <a16:creationId xmlns:a16="http://schemas.microsoft.com/office/drawing/2014/main" id="{E00254A3-C3FB-4FF4-8CC1-2C552F3BE15D}"/>
+              </a:ext>
+            </a:extLst>
+          </p:cNvPr>
+          <p:cNvPicPr>
+            <a:picLocks noChangeAspect="1"/>
+          </p:cNvPicPr>
+          <p:nvPr/>
+        </p:nvPicPr>
+        <p:blipFill>
+          <a:blip r:embed="rId4">
+            <a:extLst>
+              <a:ext uri="{28A0092B-C50C-407E-A947-70E740481C1C}">
+                <a14:useLocalDpi xmlns:a14="http://schemas.microsoft.com/office/drawing/2010/main" val="0"/>
+              </a:ext>
+            </a:extLst>
+          </a:blip>
+          <a:stretch>
+            <a:fillRect/>
+          </a:stretch>
+        </p:blipFill>
+        <p:spPr>
+          <a:xfrm>
+            <a:off x="11605736" y="7742178"/>
+            <a:ext cx="8074261" cy="3925361"/>
+          </a:xfrm>
+          <a:prstGeom prst="rect">
+            <a:avLst/>
+          </a:prstGeom>
+        </p:spPr>
+      </p:pic>
+      <p:sp>
+        <p:nvSpPr>
+          <p:cNvPr id="41" name="Szövegdoboz 40">
+            <a:extLst>
+              <a:ext uri="{FF2B5EF4-FFF2-40B4-BE49-F238E27FC236}">
+                <a16:creationId xmlns:a16="http://schemas.microsoft.com/office/drawing/2014/main" id="{7FE38020-C87B-4FD8-A797-22F4E26DCCDD}"/>
+              </a:ext>
+            </a:extLst>
+          </p:cNvPr>
+          <p:cNvSpPr txBox="1"/>
+          <p:nvPr/>
+        </p:nvSpPr>
+        <p:spPr>
+          <a:xfrm>
+            <a:off x="13340894" y="11724362"/>
+            <a:ext cx="4594517" cy="400110"/>
+          </a:xfrm>
+          <a:prstGeom prst="rect">
+            <a:avLst/>
+          </a:prstGeom>
+          <a:noFill/>
+        </p:spPr>
+        <p:txBody>
+          <a:bodyPr wrap="square" rtlCol="0">
+            <a:spAutoFit/>
+          </a:bodyPr>
+          <a:lstStyle/>
+          <a:p>
+            <a:pPr algn="ctr"/>
+            <a:r>
+              <a:rPr lang="hu-HU" sz="2000" dirty="0"/>
+              <a:t>2. ábra: Neurális háló architektúra</a:t>
+            </a:r>
+          </a:p>
+        </p:txBody>
+      </p:sp>
+      <p:sp>
+        <p:nvSpPr>
+          <p:cNvPr id="42" name="Szövegdoboz 41">
+            <a:extLst>
+              <a:ext uri="{FF2B5EF4-FFF2-40B4-BE49-F238E27FC236}">
+                <a16:creationId xmlns:a16="http://schemas.microsoft.com/office/drawing/2014/main" id="{D35C52E4-B010-4B08-9B31-C51818B503F6}"/>
+              </a:ext>
+            </a:extLst>
+          </p:cNvPr>
+          <p:cNvSpPr txBox="1"/>
+          <p:nvPr/>
+        </p:nvSpPr>
+        <p:spPr>
+          <a:xfrm>
+            <a:off x="710070" y="18885258"/>
+            <a:ext cx="9710737" cy="3013145"/>
+          </a:xfrm>
+          <a:prstGeom prst="rect">
+            <a:avLst/>
+          </a:prstGeom>
+          <a:noFill/>
+          <a:scene3d>
+            <a:camera prst="orthographicFront"/>
+            <a:lightRig rig="threePt" dir="t"/>
+          </a:scene3d>
+          <a:sp3d prstMaterial="plastic">
+            <a:bevelT w="101600" h="101600"/>
+            <a:bevelB w="101600" h="101600"/>
+            <a:extrusionClr>
+              <a:schemeClr val="bg1"/>
+            </a:extrusionClr>
+          </a:sp3d>
+        </p:spPr>
+        <p:txBody>
+          <a:bodyPr wrap="square" rtlCol="0">
+            <a:noAutofit/>
+          </a:bodyPr>
+          <a:lstStyle>
+            <a:defPPr>
+              <a:defRPr lang="hu-HU"/>
+            </a:defPPr>
+            <a:lvl1pPr>
+              <a:defRPr sz="4000" b="1">
+                <a:solidFill>
+                  <a:schemeClr val="bg1"/>
+                </a:solidFill>
+              </a:defRPr>
+            </a:lvl1pPr>
+          </a:lstStyle>
+          <a:p>
+            <a:pPr algn="just"/>
+            <a:r>
+              <a:rPr lang="hu-HU" sz="2400" b="0" dirty="0">
+                <a:solidFill>
+                  <a:schemeClr val="tx1"/>
+                </a:solidFill>
+              </a:rPr>
+              <a:t>adatát, az időt és a referencia rendszer 3 pozíció és 4 orientáció adatát. Ebből a 17 adatból állt össze a tanító adatbázis egy felügyelt regressziós tanítási feladathoz.   </a:t>
+            </a:r>
+          </a:p>
+          <a:p>
+            <a:pPr algn="just"/>
+            <a:r>
+              <a:rPr lang="hu-HU" sz="2400" b="0" dirty="0">
+                <a:solidFill>
+                  <a:schemeClr val="tx1"/>
+                </a:solidFill>
+              </a:rPr>
+              <a:t>A kis számításigény és korlátozott memória felhasználhatóság miatt a végső háló 6 rétegből állt, melyet a 2. ábra szemléltet.  Bemenetként a MARG szenzor 9 mérési adata és az egyes mérések között eltelt mintavételezési idő szolgál. A felügyelt tanításhoz szükséges címkéket pedig a Motion Capture rendszer választható paramétere képezi.</a:t>
             </a:r>
             <a:endParaRPr lang="hu-HU" dirty="0"/>
           </a:p>

</xml_diff>